<commit_message>
fix method load to 1
</commit_message>
<xml_diff>
--- a/images/sem_graphs.pptx
+++ b/images/sem_graphs.pptx
@@ -104,6 +104,11 @@
       </a:defRPr>
     </a:lvl9pPr>
   </p:defaultTextStyle>
+  <p:extLst>
+    <p:ext uri="{EFAFB233-063F-42B5-8137-9DF3F51BA10A}">
+      <p15:sldGuideLst xmlns:p15="http://schemas.microsoft.com/office/powerpoint/2012/main"/>
+    </p:ext>
+  </p:extLst>
 </p:presentation>
 </file>
 
@@ -256,7 +261,7 @@
           <a:p>
             <a:fld id="{D3F425F2-DBA5-4B6B-8A53-378D72E4A454}" type="datetimeFigureOut">
               <a:rPr lang="de-DE" smtClean="0"/>
-              <a:t>04.07.2024</a:t>
+              <a:t>09.07.2024</a:t>
             </a:fld>
             <a:endParaRPr lang="de-DE"/>
           </a:p>
@@ -456,7 +461,7 @@
           <a:p>
             <a:fld id="{D3F425F2-DBA5-4B6B-8A53-378D72E4A454}" type="datetimeFigureOut">
               <a:rPr lang="de-DE" smtClean="0"/>
-              <a:t>04.07.2024</a:t>
+              <a:t>09.07.2024</a:t>
             </a:fld>
             <a:endParaRPr lang="de-DE"/>
           </a:p>
@@ -666,7 +671,7 @@
           <a:p>
             <a:fld id="{D3F425F2-DBA5-4B6B-8A53-378D72E4A454}" type="datetimeFigureOut">
               <a:rPr lang="de-DE" smtClean="0"/>
-              <a:t>04.07.2024</a:t>
+              <a:t>09.07.2024</a:t>
             </a:fld>
             <a:endParaRPr lang="de-DE"/>
           </a:p>
@@ -866,7 +871,7 @@
           <a:p>
             <a:fld id="{D3F425F2-DBA5-4B6B-8A53-378D72E4A454}" type="datetimeFigureOut">
               <a:rPr lang="de-DE" smtClean="0"/>
-              <a:t>04.07.2024</a:t>
+              <a:t>09.07.2024</a:t>
             </a:fld>
             <a:endParaRPr lang="de-DE"/>
           </a:p>
@@ -1142,7 +1147,7 @@
           <a:p>
             <a:fld id="{D3F425F2-DBA5-4B6B-8A53-378D72E4A454}" type="datetimeFigureOut">
               <a:rPr lang="de-DE" smtClean="0"/>
-              <a:t>04.07.2024</a:t>
+              <a:t>09.07.2024</a:t>
             </a:fld>
             <a:endParaRPr lang="de-DE"/>
           </a:p>
@@ -1410,7 +1415,7 @@
           <a:p>
             <a:fld id="{D3F425F2-DBA5-4B6B-8A53-378D72E4A454}" type="datetimeFigureOut">
               <a:rPr lang="de-DE" smtClean="0"/>
-              <a:t>04.07.2024</a:t>
+              <a:t>09.07.2024</a:t>
             </a:fld>
             <a:endParaRPr lang="de-DE"/>
           </a:p>
@@ -1825,7 +1830,7 @@
           <a:p>
             <a:fld id="{D3F425F2-DBA5-4B6B-8A53-378D72E4A454}" type="datetimeFigureOut">
               <a:rPr lang="de-DE" smtClean="0"/>
-              <a:t>04.07.2024</a:t>
+              <a:t>09.07.2024</a:t>
             </a:fld>
             <a:endParaRPr lang="de-DE"/>
           </a:p>
@@ -1967,7 +1972,7 @@
           <a:p>
             <a:fld id="{D3F425F2-DBA5-4B6B-8A53-378D72E4A454}" type="datetimeFigureOut">
               <a:rPr lang="de-DE" smtClean="0"/>
-              <a:t>04.07.2024</a:t>
+              <a:t>09.07.2024</a:t>
             </a:fld>
             <a:endParaRPr lang="de-DE"/>
           </a:p>
@@ -2080,7 +2085,7 @@
           <a:p>
             <a:fld id="{D3F425F2-DBA5-4B6B-8A53-378D72E4A454}" type="datetimeFigureOut">
               <a:rPr lang="de-DE" smtClean="0"/>
-              <a:t>04.07.2024</a:t>
+              <a:t>09.07.2024</a:t>
             </a:fld>
             <a:endParaRPr lang="de-DE"/>
           </a:p>
@@ -2393,7 +2398,7 @@
           <a:p>
             <a:fld id="{D3F425F2-DBA5-4B6B-8A53-378D72E4A454}" type="datetimeFigureOut">
               <a:rPr lang="de-DE" smtClean="0"/>
-              <a:t>04.07.2024</a:t>
+              <a:t>09.07.2024</a:t>
             </a:fld>
             <a:endParaRPr lang="de-DE"/>
           </a:p>
@@ -2682,7 +2687,7 @@
           <a:p>
             <a:fld id="{D3F425F2-DBA5-4B6B-8A53-378D72E4A454}" type="datetimeFigureOut">
               <a:rPr lang="de-DE" smtClean="0"/>
-              <a:t>04.07.2024</a:t>
+              <a:t>09.07.2024</a:t>
             </a:fld>
             <a:endParaRPr lang="de-DE"/>
           </a:p>
@@ -2925,7 +2930,7 @@
           <a:p>
             <a:fld id="{D3F425F2-DBA5-4B6B-8A53-378D72E4A454}" type="datetimeFigureOut">
               <a:rPr lang="de-DE" smtClean="0"/>
-              <a:t>04.07.2024</a:t>
+              <a:t>09.07.2024</a:t>
             </a:fld>
             <a:endParaRPr lang="de-DE"/>
           </a:p>
@@ -6539,7 +6544,7 @@
             <a:pPr algn="r"/>
             <a:r>
               <a:rPr lang="de-DE" sz="1200" dirty="0"/>
-              <a:t>e1</a:t>
+              <a:t>.63</a:t>
             </a:r>
           </a:p>
         </p:txBody>
@@ -6575,7 +6580,7 @@
             <a:pPr algn="r"/>
             <a:r>
               <a:rPr lang="de-DE" sz="1200" dirty="0"/>
-              <a:t>e1</a:t>
+              <a:t>.63</a:t>
             </a:r>
           </a:p>
         </p:txBody>
@@ -6611,7 +6616,7 @@
             <a:pPr algn="r"/>
             <a:r>
               <a:rPr lang="de-DE" sz="1200" dirty="0"/>
-              <a:t>e1</a:t>
+              <a:t>.63</a:t>
             </a:r>
           </a:p>
         </p:txBody>
@@ -6647,7 +6652,7 @@
             <a:pPr algn="r"/>
             <a:r>
               <a:rPr lang="de-DE" sz="1200" dirty="0"/>
-              <a:t>e2</a:t>
+              <a:t>.68</a:t>
             </a:r>
           </a:p>
         </p:txBody>
@@ -6683,7 +6688,7 @@
             <a:pPr algn="r"/>
             <a:r>
               <a:rPr lang="de-DE" sz="1200" dirty="0"/>
-              <a:t>e2</a:t>
+              <a:t>.68</a:t>
             </a:r>
           </a:p>
         </p:txBody>
@@ -6719,7 +6724,7 @@
             <a:pPr algn="r"/>
             <a:r>
               <a:rPr lang="de-DE" sz="1200" dirty="0"/>
-              <a:t>e2</a:t>
+              <a:t>.68</a:t>
             </a:r>
           </a:p>
         </p:txBody>
@@ -6755,7 +6760,7 @@
             <a:pPr algn="r"/>
             <a:r>
               <a:rPr lang="de-DE" sz="1200" dirty="0"/>
-              <a:t>e3</a:t>
+              <a:t>.38</a:t>
             </a:r>
           </a:p>
         </p:txBody>
@@ -6791,7 +6796,182 @@
             <a:pPr algn="r"/>
             <a:r>
               <a:rPr lang="de-DE" sz="1200" dirty="0"/>
-              <a:t>e3</a:t>
+              <a:t>. 38</a:t>
+            </a:r>
+          </a:p>
+        </p:txBody>
+      </p:sp>
+      <p:sp>
+        <p:nvSpPr>
+          <p:cNvPr id="2" name="TextBox 1">
+            <a:extLst>
+              <a:ext uri="{FF2B5EF4-FFF2-40B4-BE49-F238E27FC236}">
+                <a16:creationId xmlns:a16="http://schemas.microsoft.com/office/drawing/2014/main" id="{B87C6A82-9020-D70E-7B3F-ED6B0DC8E18E}"/>
+              </a:ext>
+            </a:extLst>
+          </p:cNvPr>
+          <p:cNvSpPr txBox="1"/>
+          <p:nvPr/>
+        </p:nvSpPr>
+        <p:spPr>
+          <a:xfrm>
+            <a:off x="10905067" y="1873785"/>
+            <a:ext cx="476277" cy="276999"/>
+          </a:xfrm>
+          <a:prstGeom prst="rect">
+            <a:avLst/>
+          </a:prstGeom>
+          <a:noFill/>
+        </p:spPr>
+        <p:txBody>
+          <a:bodyPr wrap="square" rtlCol="0">
+            <a:spAutoFit/>
+          </a:bodyPr>
+          <a:lstStyle/>
+          <a:p>
+            <a:r>
+              <a:rPr lang="de-DE" sz="1200" dirty="0"/>
+              <a:t>.04</a:t>
+            </a:r>
+          </a:p>
+        </p:txBody>
+      </p:sp>
+      <p:sp>
+        <p:nvSpPr>
+          <p:cNvPr id="3" name="TextBox 2">
+            <a:extLst>
+              <a:ext uri="{FF2B5EF4-FFF2-40B4-BE49-F238E27FC236}">
+                <a16:creationId xmlns:a16="http://schemas.microsoft.com/office/drawing/2014/main" id="{A1D97644-54DA-C04B-CFAB-95FC99C42CFC}"/>
+              </a:ext>
+            </a:extLst>
+          </p:cNvPr>
+          <p:cNvSpPr txBox="1"/>
+          <p:nvPr/>
+        </p:nvSpPr>
+        <p:spPr>
+          <a:xfrm>
+            <a:off x="10905067" y="2554504"/>
+            <a:ext cx="476277" cy="276999"/>
+          </a:xfrm>
+          <a:prstGeom prst="rect">
+            <a:avLst/>
+          </a:prstGeom>
+          <a:noFill/>
+        </p:spPr>
+        <p:txBody>
+          <a:bodyPr wrap="square" rtlCol="0">
+            <a:spAutoFit/>
+          </a:bodyPr>
+          <a:lstStyle/>
+          <a:p>
+            <a:r>
+              <a:rPr lang="de-DE" sz="1200" dirty="0"/>
+              <a:t>.54</a:t>
+            </a:r>
+          </a:p>
+        </p:txBody>
+      </p:sp>
+      <p:sp>
+        <p:nvSpPr>
+          <p:cNvPr id="6" name="TextBox 5">
+            <a:extLst>
+              <a:ext uri="{FF2B5EF4-FFF2-40B4-BE49-F238E27FC236}">
+                <a16:creationId xmlns:a16="http://schemas.microsoft.com/office/drawing/2014/main" id="{E81F3E3A-CE3E-D2BC-EE85-B04080435775}"/>
+              </a:ext>
+            </a:extLst>
+          </p:cNvPr>
+          <p:cNvSpPr txBox="1"/>
+          <p:nvPr/>
+        </p:nvSpPr>
+        <p:spPr>
+          <a:xfrm>
+            <a:off x="10905067" y="3235223"/>
+            <a:ext cx="476277" cy="276999"/>
+          </a:xfrm>
+          <a:prstGeom prst="rect">
+            <a:avLst/>
+          </a:prstGeom>
+          <a:noFill/>
+        </p:spPr>
+        <p:txBody>
+          <a:bodyPr wrap="square" rtlCol="0">
+            <a:spAutoFit/>
+          </a:bodyPr>
+          <a:lstStyle/>
+          <a:p>
+            <a:r>
+              <a:rPr lang="de-DE" sz="1200" dirty="0"/>
+              <a:t>.62</a:t>
+            </a:r>
+          </a:p>
+        </p:txBody>
+      </p:sp>
+      <p:sp>
+        <p:nvSpPr>
+          <p:cNvPr id="7" name="TextBox 6">
+            <a:extLst>
+              <a:ext uri="{FF2B5EF4-FFF2-40B4-BE49-F238E27FC236}">
+                <a16:creationId xmlns:a16="http://schemas.microsoft.com/office/drawing/2014/main" id="{ED8F1B94-DF4C-5404-B84A-9637CFF49D9A}"/>
+              </a:ext>
+            </a:extLst>
+          </p:cNvPr>
+          <p:cNvSpPr txBox="1"/>
+          <p:nvPr/>
+        </p:nvSpPr>
+        <p:spPr>
+          <a:xfrm>
+            <a:off x="10905067" y="3915942"/>
+            <a:ext cx="476277" cy="276999"/>
+          </a:xfrm>
+          <a:prstGeom prst="rect">
+            <a:avLst/>
+          </a:prstGeom>
+          <a:noFill/>
+        </p:spPr>
+        <p:txBody>
+          <a:bodyPr wrap="square" rtlCol="0">
+            <a:spAutoFit/>
+          </a:bodyPr>
+          <a:lstStyle/>
+          <a:p>
+            <a:r>
+              <a:rPr lang="de-DE" sz="1200" dirty="0"/>
+              <a:t>.57</a:t>
+            </a:r>
+          </a:p>
+        </p:txBody>
+      </p:sp>
+      <p:sp>
+        <p:nvSpPr>
+          <p:cNvPr id="8" name="TextBox 7">
+            <a:extLst>
+              <a:ext uri="{FF2B5EF4-FFF2-40B4-BE49-F238E27FC236}">
+                <a16:creationId xmlns:a16="http://schemas.microsoft.com/office/drawing/2014/main" id="{5392118C-C3EE-484E-4EC6-400EC2004D0E}"/>
+              </a:ext>
+            </a:extLst>
+          </p:cNvPr>
+          <p:cNvSpPr txBox="1"/>
+          <p:nvPr/>
+        </p:nvSpPr>
+        <p:spPr>
+          <a:xfrm>
+            <a:off x="10905067" y="4596661"/>
+            <a:ext cx="476277" cy="276999"/>
+          </a:xfrm>
+          <a:prstGeom prst="rect">
+            <a:avLst/>
+          </a:prstGeom>
+          <a:noFill/>
+        </p:spPr>
+        <p:txBody>
+          <a:bodyPr wrap="square" rtlCol="0">
+            <a:spAutoFit/>
+          </a:bodyPr>
+          <a:lstStyle/>
+          <a:p>
+            <a:r>
+              <a:rPr lang="de-DE" sz="1200" dirty="0"/>
+              <a:t>.38</a:t>
             </a:r>
           </a:p>
         </p:txBody>

</xml_diff>